<commit_message>
Update new files add back 0023
</commit_message>
<xml_diff>
--- a/assets/tactile_image_files/0001-rock_cycle/0001-rock_cycle.pptx
+++ b/assets/tactile_image_files/0001-rock_cycle/0001-rock_cycle.pptx
@@ -253,7 +253,7 @@
           <a:p>
             <a:fld id="{E796F801-3BB8-A247-923B-F07F1B58D38A}" type="datetimeFigureOut">
               <a:rPr lang="en-US" smtClean="0"/>
-              <a:t>7/23/20</a:t>
+              <a:t>6/17/21</a:t>
             </a:fld>
             <a:endParaRPr lang="en-US"/>
           </a:p>
@@ -433,7 +433,7 @@
           <a:p>
             <a:fld id="{E796F801-3BB8-A247-923B-F07F1B58D38A}" type="datetimeFigureOut">
               <a:rPr lang="en-US" smtClean="0"/>
-              <a:t>7/23/20</a:t>
+              <a:t>6/17/21</a:t>
             </a:fld>
             <a:endParaRPr lang="en-US"/>
           </a:p>
@@ -603,7 +603,7 @@
           <a:p>
             <a:fld id="{E796F801-3BB8-A247-923B-F07F1B58D38A}" type="datetimeFigureOut">
               <a:rPr lang="en-US" smtClean="0"/>
-              <a:t>7/23/20</a:t>
+              <a:t>6/17/21</a:t>
             </a:fld>
             <a:endParaRPr lang="en-US"/>
           </a:p>
@@ -847,7 +847,7 @@
           <a:p>
             <a:fld id="{E796F801-3BB8-A247-923B-F07F1B58D38A}" type="datetimeFigureOut">
               <a:rPr lang="en-US" smtClean="0"/>
-              <a:t>7/23/20</a:t>
+              <a:t>6/17/21</a:t>
             </a:fld>
             <a:endParaRPr lang="en-US"/>
           </a:p>
@@ -1079,7 +1079,7 @@
           <a:p>
             <a:fld id="{E796F801-3BB8-A247-923B-F07F1B58D38A}" type="datetimeFigureOut">
               <a:rPr lang="en-US" smtClean="0"/>
-              <a:t>7/23/20</a:t>
+              <a:t>6/17/21</a:t>
             </a:fld>
             <a:endParaRPr lang="en-US"/>
           </a:p>
@@ -1446,7 +1446,7 @@
           <a:p>
             <a:fld id="{E796F801-3BB8-A247-923B-F07F1B58D38A}" type="datetimeFigureOut">
               <a:rPr lang="en-US" smtClean="0"/>
-              <a:t>7/23/20</a:t>
+              <a:t>6/17/21</a:t>
             </a:fld>
             <a:endParaRPr lang="en-US"/>
           </a:p>
@@ -1564,7 +1564,7 @@
           <a:p>
             <a:fld id="{E796F801-3BB8-A247-923B-F07F1B58D38A}" type="datetimeFigureOut">
               <a:rPr lang="en-US" smtClean="0"/>
-              <a:t>7/23/20</a:t>
+              <a:t>6/17/21</a:t>
             </a:fld>
             <a:endParaRPr lang="en-US"/>
           </a:p>
@@ -1659,7 +1659,7 @@
           <a:p>
             <a:fld id="{E796F801-3BB8-A247-923B-F07F1B58D38A}" type="datetimeFigureOut">
               <a:rPr lang="en-US" smtClean="0"/>
-              <a:t>7/23/20</a:t>
+              <a:t>6/17/21</a:t>
             </a:fld>
             <a:endParaRPr lang="en-US"/>
           </a:p>
@@ -1936,7 +1936,7 @@
           <a:p>
             <a:fld id="{E796F801-3BB8-A247-923B-F07F1B58D38A}" type="datetimeFigureOut">
               <a:rPr lang="en-US" smtClean="0"/>
-              <a:t>7/23/20</a:t>
+              <a:t>6/17/21</a:t>
             </a:fld>
             <a:endParaRPr lang="en-US"/>
           </a:p>
@@ -2193,7 +2193,7 @@
           <a:p>
             <a:fld id="{E796F801-3BB8-A247-923B-F07F1B58D38A}" type="datetimeFigureOut">
               <a:rPr lang="en-US" smtClean="0"/>
-              <a:t>7/23/20</a:t>
+              <a:t>6/17/21</a:t>
             </a:fld>
             <a:endParaRPr lang="en-US"/>
           </a:p>
@@ -2406,7 +2406,7 @@
           <a:p>
             <a:fld id="{E796F801-3BB8-A247-923B-F07F1B58D38A}" type="datetimeFigureOut">
               <a:rPr lang="en-US" smtClean="0"/>
-              <a:t>7/23/20</a:t>
+              <a:t>6/17/21</a:t>
             </a:fld>
             <a:endParaRPr lang="en-US"/>
           </a:p>
@@ -4050,12 +4050,12 @@
           <a:lstStyle/>
           <a:p>
             <a:r>
-              <a:rPr lang="en-US" sz="2400">
+              <a:rPr lang="en-US" sz="2400" dirty="0">
                 <a:latin typeface="Swell Braille" pitchFamily="49"/>
                 <a:ea typeface="Braille Normal" charset="0"/>
                 <a:cs typeface="Braille Normal" charset="0"/>
               </a:rPr>
-              <a:t>⠺⠂⠮⠗⠬⠀⠯⠀⠻⠕⠨⠝</a:t>
+              <a:t>⠺⠂⠮⠗⠬⠀⠯⠻⠕⠨⠝</a:t>
             </a:r>
           </a:p>
         </p:txBody>
@@ -4088,12 +4088,12 @@
           <a:lstStyle/>
           <a:p>
             <a:r>
-              <a:rPr lang="en-US" sz="2400">
+              <a:rPr lang="en-US" sz="2400" dirty="0">
                 <a:latin typeface="Swell Braille" pitchFamily="49"/>
                 <a:ea typeface="Braille Normal" charset="0"/>
                 <a:cs typeface="Braille Normal" charset="0"/>
               </a:rPr>
-              <a:t>⠎⠫⠊⠍⠢⠞⠎</a:t>
+              <a:t>⠎⠫⠊;t⠎</a:t>
             </a:r>
           </a:p>
         </p:txBody>
@@ -4126,12 +4126,12 @@
           <a:lstStyle/>
           <a:p>
             <a:r>
-              <a:rPr lang="en-US" sz="2400">
+              <a:rPr lang="en-US" sz="2400" dirty="0">
                 <a:latin typeface="Swell Braille" pitchFamily="49"/>
                 <a:ea typeface="Braille Normal" charset="0"/>
                 <a:cs typeface="Braille Normal" charset="0"/>
               </a:rPr>
-              <a:t>⠎⠫⠊⠍⠢⠞⠜⠽⠀⠗⠕⠉⠅⠎</a:t>
+              <a:t>⠎⠫⠊;t⠜⠽⠀⠗⠕⠉⠅⠎</a:t>
             </a:r>
           </a:p>
         </p:txBody>
@@ -4164,12 +4164,12 @@
           <a:lstStyle/>
           <a:p>
             <a:r>
-              <a:rPr lang="en-US" sz="2400">
+              <a:rPr lang="en-US" sz="2400" dirty="0">
                 <a:latin typeface="Swell Braille" pitchFamily="49"/>
                 <a:ea typeface="Braille Normal" charset="0"/>
                 <a:cs typeface="Braille Normal" charset="0"/>
               </a:rPr>
-              <a:t>⠍⠑⠞⠁⠍⠕⠗⠏⠓⠊⠉⠀⠗⠕⠉⠅⠎</a:t>
+              <a:t>⠍⠑⠞⠁⠍⠕⠗⠏⠓⠊⠉⠗⠕⠉⠅⠎</a:t>
             </a:r>
           </a:p>
         </p:txBody>
@@ -4240,12 +4240,12 @@
           <a:lstStyle/>
           <a:p>
             <a:r>
-              <a:rPr lang="en-US" sz="2400">
+              <a:rPr lang="en-US" sz="2400" dirty="0">
                 <a:latin typeface="Swell Braille" pitchFamily="49"/>
                 <a:ea typeface="Braille Normal" charset="0"/>
                 <a:cs typeface="Braille Normal" charset="0"/>
               </a:rPr>
-              <a:t>⠊⠛⠝⠑⠳⠎⠀⠗⠕⠉⠅⠎</a:t>
+              <a:t>⠊⠛⠝⠑⠳⠎⠗⠕⠉⠅⠎</a:t>
             </a:r>
           </a:p>
         </p:txBody>
@@ -4725,7 +4725,7 @@
         <p:spPr>
           <a:xfrm>
             <a:off x="2891657" y="192791"/>
-            <a:ext cx="2858475" cy="461665"/>
+            <a:ext cx="3526928" cy="461665"/>
           </a:xfrm>
           <a:prstGeom prst="rect">
             <a:avLst/>
@@ -4738,10 +4738,10 @@
           <a:lstStyle/>
           <a:p>
             <a:r>
-              <a:rPr lang="en-US" sz="2400">
+              <a:rPr lang="en-US" sz="2400" dirty="0">
                 <a:latin typeface="Swell Braille" pitchFamily="49"/>
               </a:rPr>
-              <a:t>⠠⠗⠕⠉⠅⠀⠠⠉⠽⠉⠇⠑</a:t>
+              <a:t>⠠! ⠠⠗⠕⠉⠅⠀⠠⠉⠽⠉⠇⠑</a:t>
             </a:r>
           </a:p>
         </p:txBody>
@@ -4810,7 +4810,7 @@
           <a:lstStyle/>
           <a:p>
             <a:r>
-              <a:rPr lang="en-US" sz="2400">
+              <a:rPr lang="en-US" sz="2400" dirty="0">
                 <a:latin typeface="Swell Braille" pitchFamily="49"/>
               </a:rPr>
               <a:t>⠙⠑⠏⠕⠎⠊⠰⠝</a:t>
@@ -4926,10 +4926,10 @@
           <a:lstStyle/>
           <a:p>
             <a:r>
-              <a:rPr lang="en-US" sz="2400">
+              <a:rPr lang="en-US" sz="2400" dirty="0">
                 <a:latin typeface="Swell Braille" pitchFamily="49"/>
               </a:rPr>
-              <a:t>⠓⠂⠞⠀⠯⠀⠏⠗⠑⠎⠎⠥⠗⠑</a:t>
+              <a:t>⠓⠂⠞⠀⠯⠀ ⠏⠗⠑⠎⠎⠥⠗⠑</a:t>
             </a:r>
           </a:p>
         </p:txBody>

</xml_diff>